<commit_message>
added 2nd thesis to presentation
</commit_message>
<xml_diff>
--- a/uebung-1/Forschungsmethoden-WS2012-Uebung-1-Gruppe-8.pptx
+++ b/uebung-1/Forschungsmethoden-WS2012-Uebung-1-Gruppe-8.pptx
@@ -2579,19 +2579,7 @@
               <a:rPr lang="en-US" sz="1000" dirty="0" smtClean="0">
                 <a:latin typeface="Arial" charset="0"/>
               </a:rPr>
-              <a:t> 1	       		</a:t>
-            </a:r>
-            <a:r>
-              <a:rPr lang="en-US" sz="1000" dirty="0" smtClean="0">
-                <a:latin typeface="Arial" charset="0"/>
-              </a:rPr>
-              <a:t>WS2012</a:t>
-            </a:r>
-            <a:r>
-              <a:rPr lang="en-US" sz="1000" dirty="0" smtClean="0">
-                <a:latin typeface="Arial" charset="0"/>
-              </a:rPr>
-              <a:t>			</a:t>
+              <a:t> 1	       		WS2012			</a:t>
             </a:r>
             <a:r>
               <a:rPr lang="de-AT" sz="1000" dirty="0" smtClean="0">
@@ -3101,7 +3089,6 @@
               <a:rPr lang="de-DE" sz="2400" dirty="0" smtClean="0"/>
               <a:t>8</a:t>
             </a:r>
-            <a:endParaRPr lang="de-DE" sz="2400" dirty="0" smtClean="0"/>
           </a:p>
           <a:p>
             <a:pPr algn="l">
@@ -3119,17 +3106,12 @@
             </a:pPr>
             <a:r>
               <a:rPr lang="de-DE" sz="2400" b="1" dirty="0" smtClean="0"/>
-              <a:t>Vortragende(r):	</a:t>
-            </a:r>
-            <a:r>
-              <a:rPr lang="de-DE" sz="2400" b="1" dirty="0" smtClean="0"/>
-              <a:t>Bernhard Fleck</a:t>
+              <a:t>Vortragende(r):	Bernhard Fleck</a:t>
             </a:r>
             <a:r>
               <a:rPr lang="de-DE" sz="2400" dirty="0" smtClean="0"/>
               <a:t>  </a:t>
             </a:r>
-            <a:endParaRPr lang="de-DE" sz="2400" dirty="0" smtClean="0"/>
           </a:p>
           <a:p>
             <a:pPr algn="l">
@@ -3147,11 +3129,7 @@
             </a:r>
             <a:r>
               <a:rPr lang="de-DE" sz="2400" dirty="0" smtClean="0"/>
-              <a:t>	</a:t>
-            </a:r>
-            <a:r>
-              <a:rPr lang="de-DE" sz="2400" dirty="0" smtClean="0"/>
-              <a:t>Rafael </a:t>
+              <a:t>	Rafael </a:t>
             </a:r>
             <a:r>
               <a:rPr lang="de-DE" sz="2400" dirty="0" err="1" smtClean="0"/>
@@ -3167,11 +3145,7 @@
             </a:pPr>
             <a:r>
               <a:rPr lang="de-DE" sz="2400" dirty="0" smtClean="0"/>
-              <a:t>			</a:t>
-            </a:r>
-            <a:r>
-              <a:rPr lang="de-DE" sz="2400" dirty="0" smtClean="0"/>
-              <a:t>Stephan </a:t>
+              <a:t>			Stephan </a:t>
             </a:r>
             <a:r>
               <a:rPr lang="de-DE" sz="2400" dirty="0" err="1" smtClean="0"/>
@@ -3187,11 +3161,7 @@
             </a:pPr>
             <a:r>
               <a:rPr lang="de-DE" sz="2400" dirty="0" smtClean="0"/>
-              <a:t>			</a:t>
-            </a:r>
-            <a:r>
-              <a:rPr lang="de-DE" sz="2400" dirty="0" smtClean="0"/>
-              <a:t>Harald </a:t>
+              <a:t>			Harald </a:t>
             </a:r>
             <a:r>
               <a:rPr lang="de-DE" sz="2400" dirty="0" err="1" smtClean="0"/>
@@ -3297,15 +3267,7 @@
                   <a:srgbClr val="000080"/>
                 </a:solidFill>
               </a:rPr>
-              <a:t>aus EPILOG </a:t>
-            </a:r>
-            <a:r>
-              <a:rPr lang="de-DE" sz="3200" dirty="0" smtClean="0">
-                <a:solidFill>
-                  <a:srgbClr val="000080"/>
-                </a:solidFill>
-              </a:rPr>
-              <a:t>WS 2008</a:t>
+              <a:t>aus EPILOG WS 2008</a:t>
             </a:r>
             <a:endParaRPr lang="en-US" sz="2000" dirty="0" smtClean="0">
               <a:solidFill>
@@ -3447,7 +3409,6 @@
               <a:rPr lang="de-AT" sz="1800" dirty="0" smtClean="0"/>
               <a:t>-Karate</a:t>
             </a:r>
-            <a:endParaRPr lang="de-AT" sz="1800" dirty="0" smtClean="0"/>
           </a:p>
           <a:p>
             <a:r>
@@ -3477,7 +3438,6 @@
               <a:rPr lang="de-AT" sz="1800" dirty="0" smtClean="0"/>
               <a:t>Winfried Mayr</a:t>
             </a:r>
-            <a:endParaRPr lang="de-AT" sz="1800" dirty="0" smtClean="0"/>
           </a:p>
           <a:p>
             <a:r>
@@ -3488,7 +3448,6 @@
               <a:rPr lang="de-AT" sz="1800" dirty="0" smtClean="0"/>
               <a:t>Best Poster Award der Fakultät für Informatik </a:t>
             </a:r>
-            <a:endParaRPr lang="de-AT" sz="1800" dirty="0" smtClean="0"/>
           </a:p>
           <a:p>
             <a:r>
@@ -3514,30 +3473,14 @@
           <a:p>
             <a:r>
               <a:rPr lang="de-AT" sz="1800" b="1" dirty="0" smtClean="0"/>
-              <a:t>Problemstellung</a:t>
-            </a:r>
-            <a:r>
-              <a:rPr lang="de-AT" sz="1800" b="1" dirty="0" smtClean="0"/>
-              <a:t>:</a:t>
+              <a:t>Problemstellung:</a:t>
             </a:r>
           </a:p>
           <a:p>
             <a:pPr lvl="1"/>
             <a:r>
               <a:rPr lang="de-AT" sz="1600" dirty="0" smtClean="0"/>
-              <a:t>Analyse und Vergleich </a:t>
-            </a:r>
-            <a:r>
-              <a:rPr lang="de-AT" sz="1600" dirty="0" smtClean="0"/>
-              <a:t>von </a:t>
-            </a:r>
-            <a:r>
-              <a:rPr lang="de-AT" sz="1600" dirty="0" smtClean="0"/>
-              <a:t>Schlagtechniken und </a:t>
-            </a:r>
-            <a:r>
-              <a:rPr lang="de-AT" sz="1600" dirty="0" smtClean="0"/>
-              <a:t>Bewegungen durch</a:t>
+              <a:t>Analyse und Vergleich von Schlagtechniken und Bewegungen durch</a:t>
             </a:r>
           </a:p>
           <a:p>
@@ -3557,22 +3500,14 @@
           <a:p>
             <a:r>
               <a:rPr lang="de-AT" sz="1800" b="1" dirty="0" smtClean="0"/>
-              <a:t>Verwendete </a:t>
-            </a:r>
-            <a:r>
-              <a:rPr lang="de-AT" sz="1800" b="1" dirty="0" smtClean="0"/>
-              <a:t>Methoden:</a:t>
+              <a:t>Verwendete Methoden:</a:t>
             </a:r>
           </a:p>
           <a:p>
             <a:pPr lvl="1"/>
             <a:r>
               <a:rPr lang="de-AT" sz="1600" dirty="0" smtClean="0"/>
-              <a:t>Literatur Recherche &amp; </a:t>
-            </a:r>
-            <a:r>
-              <a:rPr lang="de-AT" sz="1600" dirty="0" smtClean="0"/>
-              <a:t>Zitieren</a:t>
+              <a:t>Literatur Recherche &amp; Zitieren</a:t>
             </a:r>
           </a:p>
           <a:p>
@@ -3581,7 +3516,6 @@
               <a:rPr lang="de-AT" sz="1600" dirty="0" smtClean="0"/>
               <a:t>Kontrollierte Experimente &amp; Messen</a:t>
             </a:r>
-            <a:endParaRPr lang="de-AT" sz="1600" dirty="0" smtClean="0"/>
           </a:p>
           <a:p>
             <a:r>
@@ -3595,7 +3529,6 @@
               <a:rPr lang="de-AT" sz="1600" dirty="0" smtClean="0"/>
               <a:t>Schlagwirkung nicht unbedingt abhängig vom Gewicht</a:t>
             </a:r>
-            <a:endParaRPr lang="de-AT" sz="1600" dirty="0" smtClean="0"/>
           </a:p>
           <a:p>
             <a:pPr lvl="1"/>
@@ -3608,11 +3541,7 @@
             <a:pPr lvl="1"/>
             <a:r>
               <a:rPr lang="de-AT" sz="1600" dirty="0" smtClean="0"/>
-              <a:t>g</a:t>
-            </a:r>
-            <a:r>
-              <a:rPr lang="de-AT" sz="1600" dirty="0" smtClean="0"/>
-              <a:t>eschwungene Schläge sind energiereicher als gerade (Faktor 2)</a:t>
+              <a:t>geschwungene Schläge sind energiereicher als gerade (Faktor 2)</a:t>
             </a:r>
           </a:p>
           <a:p>
@@ -3621,7 +3550,6 @@
               <a:rPr lang="de-AT" sz="1600" dirty="0" smtClean="0"/>
               <a:t>Tritte sind energiereicher als Schläge (Faktor 3,5 bis 7)</a:t>
             </a:r>
-            <a:endParaRPr lang="de-AT" sz="1600" dirty="0" smtClean="0"/>
           </a:p>
           <a:p>
             <a:endParaRPr lang="de-AT" sz="2400" dirty="0"/>
@@ -3713,166 +3641,270 @@
           <a:lstStyle/>
           <a:p>
             <a:r>
-              <a:rPr lang="de-AT" sz="2000" b="1" dirty="0" smtClean="0"/>
+              <a:rPr lang="de-AT" sz="1800" b="1" dirty="0" smtClean="0"/>
               <a:t>Titel: </a:t>
             </a:r>
             <a:r>
-              <a:rPr lang="en-US" sz="2000" dirty="0" smtClean="0"/>
-              <a:t>Evaluating Object-Oriented Software Metrics for Source </a:t>
-            </a:r>
-            <a:r>
-              <a:rPr lang="en-US" sz="2000" dirty="0" smtClean="0"/>
-              <a:t>Code Change </a:t>
-            </a:r>
-            <a:r>
-              <a:rPr lang="en-US" sz="2000" dirty="0" smtClean="0"/>
-              <a:t>Analysis </a:t>
-            </a:r>
-            <a:r>
-              <a:rPr lang="en-US" sz="2000" dirty="0" smtClean="0"/>
-              <a:t>- </a:t>
-            </a:r>
-            <a:r>
-              <a:rPr lang="en-US" sz="2000" dirty="0" smtClean="0"/>
-              <a:t>A Study on Open Source Projects</a:t>
-            </a:r>
-            <a:endParaRPr lang="de-AT" sz="2000" dirty="0" smtClean="0"/>
-          </a:p>
-          <a:p>
-            <a:r>
-              <a:rPr lang="de-AT" sz="2000" b="1" dirty="0" err="1" smtClean="0"/>
+              <a:rPr lang="en-US" sz="1800" dirty="0" smtClean="0"/>
+              <a:t>Evaluating Object-Oriented Software Metrics for Source Code Change Analysis - A Study on Open Source Projects</a:t>
+            </a:r>
+            <a:endParaRPr lang="de-AT" sz="1800" dirty="0" smtClean="0"/>
+          </a:p>
+          <a:p>
+            <a:r>
+              <a:rPr lang="de-AT" sz="1800" b="1" dirty="0" err="1" smtClean="0"/>
               <a:t>AutorIn</a:t>
             </a:r>
             <a:r>
-              <a:rPr lang="de-AT" sz="2000" b="1" dirty="0" smtClean="0"/>
+              <a:rPr lang="de-AT" sz="1800" b="1" dirty="0" smtClean="0"/>
               <a:t>: </a:t>
             </a:r>
             <a:r>
-              <a:rPr lang="de-AT" sz="2000" dirty="0" smtClean="0"/>
+              <a:rPr lang="de-AT" sz="1800" dirty="0" smtClean="0"/>
               <a:t>Andreas </a:t>
             </a:r>
             <a:r>
-              <a:rPr lang="de-AT" sz="2000" dirty="0" err="1" smtClean="0"/>
+              <a:rPr lang="de-AT" sz="1800" dirty="0" err="1" smtClean="0"/>
               <a:t>Mauczka</a:t>
             </a:r>
-            <a:endParaRPr lang="de-AT" sz="2000" dirty="0" smtClean="0"/>
-          </a:p>
-          <a:p>
-            <a:r>
-              <a:rPr lang="de-AT" sz="2000" b="1" dirty="0" smtClean="0"/>
+            <a:endParaRPr lang="de-AT" sz="1800" dirty="0" smtClean="0"/>
+          </a:p>
+          <a:p>
+            <a:r>
+              <a:rPr lang="de-AT" sz="1800" b="1" dirty="0" smtClean="0"/>
               <a:t>Betreuung: </a:t>
             </a:r>
             <a:r>
-              <a:rPr lang="de-AT" sz="2000" dirty="0" smtClean="0"/>
+              <a:rPr lang="de-AT" sz="1800" dirty="0" smtClean="0"/>
               <a:t>Thomas </a:t>
             </a:r>
             <a:r>
-              <a:rPr lang="de-AT" sz="2000" dirty="0" err="1" smtClean="0"/>
+              <a:rPr lang="de-AT" sz="1800" dirty="0" err="1" smtClean="0"/>
               <a:t>Grechenig</a:t>
             </a:r>
             <a:r>
-              <a:rPr lang="de-AT" sz="2000" dirty="0" smtClean="0"/>
+              <a:rPr lang="de-AT" sz="1800" dirty="0" smtClean="0"/>
               <a:t> und Mario </a:t>
             </a:r>
             <a:r>
-              <a:rPr lang="de-AT" sz="2000" dirty="0" err="1" smtClean="0"/>
+              <a:rPr lang="de-AT" sz="1800" dirty="0" err="1" smtClean="0"/>
               <a:t>Bernhart</a:t>
             </a:r>
-            <a:endParaRPr lang="de-AT" sz="2000" dirty="0" smtClean="0"/>
-          </a:p>
-          <a:p>
-            <a:r>
-              <a:rPr lang="de-AT" sz="2000" b="1" dirty="0" smtClean="0"/>
+            <a:endParaRPr lang="de-AT" sz="1800" dirty="0" smtClean="0"/>
+          </a:p>
+          <a:p>
+            <a:r>
+              <a:rPr lang="de-AT" sz="1800" b="1" dirty="0" smtClean="0"/>
               <a:t>Preis: </a:t>
             </a:r>
             <a:r>
-              <a:rPr lang="de-AT" sz="2000" dirty="0" smtClean="0"/>
+              <a:rPr lang="de-AT" sz="1800" dirty="0" smtClean="0"/>
               <a:t>nein</a:t>
             </a:r>
-            <a:endParaRPr lang="de-AT" sz="2000" dirty="0" smtClean="0"/>
-          </a:p>
-          <a:p>
-            <a:r>
-              <a:rPr lang="de-AT" sz="2000" b="1" dirty="0" smtClean="0"/>
+          </a:p>
+          <a:p>
+            <a:r>
+              <a:rPr lang="de-AT" sz="1800" b="1" dirty="0" smtClean="0"/>
               <a:t>Themengebiet:</a:t>
             </a:r>
           </a:p>
           <a:p>
             <a:pPr lvl="1"/>
             <a:r>
-              <a:rPr lang="de-AT" sz="1800" dirty="0" smtClean="0"/>
-              <a:t>&lt;…&gt;</a:t>
+              <a:rPr lang="de-AT" sz="1600" dirty="0" err="1" smtClean="0"/>
+              <a:t>Datamining</a:t>
+            </a:r>
+            <a:r>
+              <a:rPr lang="de-AT" sz="1600" dirty="0" smtClean="0"/>
+              <a:t> von Versionsverwaltungssystemen</a:t>
             </a:r>
           </a:p>
           <a:p>
             <a:pPr lvl="1"/>
             <a:r>
-              <a:rPr lang="de-AT" sz="1800" dirty="0" smtClean="0"/>
-              <a:t>&lt;…&gt;</a:t>
-            </a:r>
-          </a:p>
-          <a:p>
-            <a:r>
-              <a:rPr lang="de-AT" sz="2000" b="1" dirty="0" smtClean="0"/>
-              <a:t>Problemstellung:</a:t>
+              <a:rPr lang="de-AT" sz="1600" dirty="0" smtClean="0"/>
+              <a:t>Software </a:t>
+            </a:r>
+            <a:r>
+              <a:rPr lang="de-AT" sz="1600" dirty="0" err="1" smtClean="0"/>
+              <a:t>Metriken</a:t>
+            </a:r>
+            <a:r>
+              <a:rPr lang="de-AT" sz="1600" dirty="0" smtClean="0"/>
+              <a:t> (</a:t>
+            </a:r>
+            <a:r>
+              <a:rPr lang="de-AT" sz="1600" dirty="0" smtClean="0"/>
+              <a:t>o</a:t>
+            </a:r>
+            <a:r>
+              <a:rPr lang="de-AT" sz="1600" dirty="0" smtClean="0"/>
+              <a:t>bjektorientierter Programmiersprachen)</a:t>
+            </a:r>
+            <a:endParaRPr lang="de-AT" sz="1600" dirty="0" smtClean="0"/>
+          </a:p>
+          <a:p>
+            <a:r>
+              <a:rPr lang="de-AT" sz="1800" b="1" dirty="0" smtClean="0"/>
+              <a:t>Problemstellung</a:t>
+            </a:r>
+            <a:r>
+              <a:rPr lang="de-AT" sz="1800" b="1" dirty="0" smtClean="0"/>
+              <a:t>:</a:t>
             </a:r>
           </a:p>
           <a:p>
             <a:pPr lvl="1"/>
             <a:r>
-              <a:rPr lang="de-AT" sz="1800" dirty="0" smtClean="0"/>
-              <a:t>&lt;…&gt;</a:t>
+              <a:rPr lang="de-AT" sz="1600" dirty="0" smtClean="0"/>
+              <a:t>Gibt es einen Zusammenhang zwischen Code </a:t>
+            </a:r>
+            <a:r>
+              <a:rPr lang="de-AT" sz="1600" dirty="0" err="1" smtClean="0"/>
+              <a:t>Changes</a:t>
+            </a:r>
+            <a:r>
+              <a:rPr lang="de-AT" sz="1600" dirty="0" smtClean="0"/>
+              <a:t> und Software </a:t>
+            </a:r>
+            <a:r>
+              <a:rPr lang="de-AT" sz="1600" dirty="0" err="1" smtClean="0"/>
+              <a:t>Metriken</a:t>
+            </a:r>
+            <a:r>
+              <a:rPr lang="de-AT" sz="1600" dirty="0" smtClean="0"/>
+              <a:t>?</a:t>
             </a:r>
           </a:p>
           <a:p>
             <a:pPr lvl="1"/>
             <a:r>
-              <a:rPr lang="de-AT" sz="1800" dirty="0" smtClean="0"/>
-              <a:t>&lt;…&gt;</a:t>
-            </a:r>
-          </a:p>
-          <a:p>
-            <a:r>
-              <a:rPr lang="de-AT" sz="2000" b="1" dirty="0" smtClean="0"/>
-              <a:t>Verwendete Methoden:</a:t>
+              <a:rPr lang="de-AT" sz="1600" dirty="0" smtClean="0"/>
+              <a:t>Validierung / Abschätzung </a:t>
+            </a:r>
+            <a:r>
+              <a:rPr lang="de-AT" sz="1600" dirty="0" smtClean="0"/>
+              <a:t>von Software </a:t>
+            </a:r>
+            <a:r>
+              <a:rPr lang="de-AT" sz="1600" dirty="0" err="1" smtClean="0"/>
+              <a:t>Metriken</a:t>
+            </a:r>
+            <a:r>
+              <a:rPr lang="de-AT" sz="1600" dirty="0" smtClean="0"/>
+              <a:t> mit Code Change </a:t>
+            </a:r>
+            <a:r>
+              <a:rPr lang="de-AT" sz="1600" dirty="0" smtClean="0"/>
+              <a:t>Analysis</a:t>
+            </a:r>
+            <a:endParaRPr lang="de-AT" sz="1600" dirty="0" smtClean="0"/>
+          </a:p>
+          <a:p>
+            <a:r>
+              <a:rPr lang="de-AT" sz="1800" b="1" dirty="0" smtClean="0"/>
+              <a:t>Verwendete </a:t>
+            </a:r>
+            <a:r>
+              <a:rPr lang="de-AT" sz="1800" b="1" dirty="0" smtClean="0"/>
+              <a:t>Methoden:</a:t>
             </a:r>
           </a:p>
           <a:p>
             <a:pPr lvl="1"/>
             <a:r>
-              <a:rPr lang="de-AT" sz="1800" dirty="0" smtClean="0"/>
-              <a:t>&lt;…&gt;</a:t>
-            </a:r>
+              <a:rPr lang="de-AT" sz="1600" dirty="0" smtClean="0"/>
+              <a:t>Literatur Recherche &amp; Zitieren</a:t>
+            </a:r>
+            <a:endParaRPr lang="de-AT" sz="1600" dirty="0" smtClean="0"/>
           </a:p>
           <a:p>
             <a:pPr lvl="1"/>
             <a:r>
-              <a:rPr lang="de-AT" sz="1800" dirty="0" smtClean="0"/>
-              <a:t>&lt;…&gt;</a:t>
-            </a:r>
-          </a:p>
-          <a:p>
-            <a:r>
-              <a:rPr lang="de-AT" sz="2000" b="1" dirty="0" smtClean="0"/>
+              <a:rPr lang="de-AT" sz="1600" dirty="0" smtClean="0"/>
+              <a:t>Implementieren</a:t>
+            </a:r>
+          </a:p>
+          <a:p>
+            <a:pPr lvl="1"/>
+            <a:r>
+              <a:rPr lang="de-AT" sz="1600" dirty="0" smtClean="0"/>
+              <a:t>Studie</a:t>
+            </a:r>
+            <a:endParaRPr lang="de-AT" sz="1600" dirty="0" smtClean="0"/>
+          </a:p>
+          <a:p>
+            <a:r>
+              <a:rPr lang="de-AT" sz="1800" b="1" dirty="0" smtClean="0"/>
               <a:t>Ergebnis: </a:t>
             </a:r>
           </a:p>
           <a:p>
             <a:pPr lvl="1"/>
             <a:r>
-              <a:rPr lang="de-AT" sz="1800" dirty="0" smtClean="0"/>
-              <a:t>&lt;…&gt;</a:t>
-            </a:r>
+              <a:rPr lang="de-AT" sz="1600" dirty="0" smtClean="0"/>
+              <a:t>Komplexere </a:t>
+            </a:r>
+            <a:r>
+              <a:rPr lang="de-AT" sz="1600" dirty="0" err="1" smtClean="0"/>
+              <a:t>Metriken</a:t>
+            </a:r>
+            <a:r>
+              <a:rPr lang="de-AT" sz="1600" dirty="0" smtClean="0"/>
+              <a:t> sind weniger aussagekräftig in Bezug auf </a:t>
+            </a:r>
+            <a:r>
+              <a:rPr lang="de-AT" sz="1600" dirty="0" smtClean="0"/>
+              <a:t>Code </a:t>
+            </a:r>
+            <a:r>
+              <a:rPr lang="de-AT" sz="1600" dirty="0" err="1" smtClean="0"/>
+              <a:t>Changes</a:t>
+            </a:r>
+            <a:endParaRPr lang="de-AT" sz="1600" dirty="0" smtClean="0"/>
+          </a:p>
+          <a:p>
+            <a:pPr lvl="2"/>
+            <a:r>
+              <a:rPr lang="de-AT" sz="1600" dirty="0" smtClean="0"/>
+              <a:t>Code Level </a:t>
+            </a:r>
+            <a:r>
+              <a:rPr lang="de-AT" sz="1600" dirty="0" err="1" smtClean="0"/>
+              <a:t>Metriken</a:t>
+            </a:r>
+            <a:r>
+              <a:rPr lang="de-AT" sz="1600" dirty="0" smtClean="0"/>
+              <a:t> besser als Struktur </a:t>
+            </a:r>
+            <a:r>
+              <a:rPr lang="de-AT" sz="1600" dirty="0" err="1" smtClean="0"/>
+              <a:t>Metriken</a:t>
+            </a:r>
+            <a:endParaRPr lang="de-AT" sz="1600" dirty="0" smtClean="0"/>
           </a:p>
           <a:p>
             <a:pPr lvl="1"/>
             <a:r>
-              <a:rPr lang="de-AT" sz="1800" dirty="0" smtClean="0"/>
-              <a:t>&lt;…&gt;</a:t>
-            </a:r>
-          </a:p>
-          <a:p>
-            <a:endParaRPr lang="de-AT" sz="2400" dirty="0"/>
+              <a:rPr lang="de-AT" sz="1600" dirty="0" smtClean="0"/>
+              <a:t>Zusammenhang zwischen Code </a:t>
+            </a:r>
+            <a:r>
+              <a:rPr lang="de-AT" sz="1600" dirty="0" err="1" smtClean="0"/>
+              <a:t>Changes</a:t>
+            </a:r>
+            <a:r>
+              <a:rPr lang="de-AT" sz="1600" dirty="0" smtClean="0"/>
+              <a:t> und </a:t>
+            </a:r>
+            <a:r>
+              <a:rPr lang="de-AT" sz="1600" dirty="0" err="1" smtClean="0"/>
+              <a:t>Metriken</a:t>
+            </a:r>
+            <a:endParaRPr lang="de-AT" sz="1600" dirty="0" smtClean="0"/>
+          </a:p>
+          <a:p>
+            <a:endParaRPr lang="de-AT" sz="2000" dirty="0"/>
           </a:p>
         </p:txBody>
       </p:sp>
@@ -3942,7 +3974,7 @@
         </p:nvGraphicFramePr>
         <p:xfrm>
           <a:off x="756270" y="1697125"/>
-          <a:ext cx="7954593" cy="1807464"/>
+          <a:ext cx="7954593" cy="2237232"/>
         </p:xfrm>
         <a:graphic>
           <a:graphicData uri="http://schemas.openxmlformats.org/drawingml/2006/table">
@@ -4004,7 +4036,7 @@
                     <a:p>
                       <a:r>
                         <a:rPr lang="de-AT" sz="1600" dirty="0" smtClean="0"/>
-                        <a:t>&lt;Methode&gt;</a:t>
+                        <a:t>Literatur Recherche &amp; Zitieren</a:t>
                       </a:r>
                       <a:endParaRPr lang="de-AT" sz="1600" dirty="0"/>
                     </a:p>
@@ -4018,7 +4050,7 @@
                     <a:p>
                       <a:r>
                         <a:rPr lang="de-AT" sz="1600" dirty="0" smtClean="0"/>
-                        <a:t>&lt;Anzahl&gt;</a:t>
+                        <a:t>hoffentlich 12 ;)</a:t>
                       </a:r>
                       <a:endParaRPr lang="de-AT" sz="1600" dirty="0"/>
                     </a:p>
@@ -4034,7 +4066,7 @@
                     <a:p>
                       <a:r>
                         <a:rPr lang="de-AT" sz="1600" dirty="0" smtClean="0"/>
-                        <a:t>&lt;Methode&gt;</a:t>
+                        <a:t>Implementieren</a:t>
                       </a:r>
                       <a:endParaRPr lang="de-AT" sz="1600" dirty="0"/>
                     </a:p>
@@ -4048,7 +4080,54 @@
                     <a:p>
                       <a:r>
                         <a:rPr lang="de-AT" sz="1600" dirty="0" smtClean="0"/>
-                        <a:t>&lt;Anzahl&gt;</a:t>
+                        <a:t>1</a:t>
+                      </a:r>
+                      <a:endParaRPr lang="de-AT" sz="1600" dirty="0"/>
+                    </a:p>
+                  </a:txBody>
+                  <a:tcPr/>
+                </a:tc>
+              </a:tr>
+              <a:tr h="429768">
+                <a:tc>
+                  <a:txBody>
+                    <a:bodyPr/>
+                    <a:lstStyle/>
+                    <a:p>
+                      <a:pPr marL="0" marR="0" indent="0" algn="l" defTabSz="914400" rtl="0" eaLnBrk="1" fontAlgn="auto" latinLnBrk="0" hangingPunct="1">
+                        <a:lnSpc>
+                          <a:spcPct val="100000"/>
+                        </a:lnSpc>
+                        <a:spcBef>
+                          <a:spcPts val="0"/>
+                        </a:spcBef>
+                        <a:spcAft>
+                          <a:spcPts val="0"/>
+                        </a:spcAft>
+                        <a:buClrTx/>
+                        <a:buSzTx/>
+                        <a:buFontTx/>
+                        <a:buNone/>
+                        <a:tabLst/>
+                        <a:defRPr/>
+                      </a:pPr>
+                      <a:r>
+                        <a:rPr lang="de-AT" sz="1600" baseline="0" dirty="0" smtClean="0"/>
+                        <a:t>Experiment</a:t>
+                      </a:r>
+                      <a:endParaRPr lang="de-AT" sz="1600" dirty="0" smtClean="0"/>
+                    </a:p>
+                  </a:txBody>
+                  <a:tcPr/>
+                </a:tc>
+                <a:tc>
+                  <a:txBody>
+                    <a:bodyPr/>
+                    <a:lstStyle/>
+                    <a:p>
+                      <a:r>
+                        <a:rPr lang="de-AT" sz="1600" dirty="0" smtClean="0"/>
+                        <a:t>1</a:t>
                       </a:r>
                       <a:endParaRPr lang="de-AT" sz="1600" dirty="0"/>
                     </a:p>
@@ -4064,9 +4143,8 @@
                     <a:p>
                       <a:r>
                         <a:rPr lang="de-AT" sz="1600" dirty="0" smtClean="0"/>
-                        <a:t>…</a:t>
+                        <a:t>Studie</a:t>
                       </a:r>
-                      <a:endParaRPr lang="de-AT" sz="1600" dirty="0"/>
                     </a:p>
                   </a:txBody>
                   <a:tcPr/>
@@ -4076,6 +4154,10 @@
                     <a:bodyPr/>
                     <a:lstStyle/>
                     <a:p>
+                      <a:r>
+                        <a:rPr lang="de-AT" sz="1600" dirty="0" smtClean="0"/>
+                        <a:t>1</a:t>
+                      </a:r>
                       <a:endParaRPr lang="de-AT" sz="1600" dirty="0"/>
                     </a:p>
                   </a:txBody>

</xml_diff>

<commit_message>
added statistics for used methods
</commit_message>
<xml_diff>
--- a/uebung-1/Forschungsmethoden-WS2012-Uebung-1-Gruppe-8.pptx
+++ b/uebung-1/Forschungsmethoden-WS2012-Uebung-1-Gruppe-8.pptx
@@ -3731,26 +3731,13 @@
             </a:r>
             <a:r>
               <a:rPr lang="de-AT" sz="1600" dirty="0" smtClean="0"/>
-              <a:t> (</a:t>
-            </a:r>
-            <a:r>
-              <a:rPr lang="de-AT" sz="1600" dirty="0" smtClean="0"/>
-              <a:t>o</a:t>
-            </a:r>
-            <a:r>
-              <a:rPr lang="de-AT" sz="1600" dirty="0" smtClean="0"/>
-              <a:t>bjektorientierter Programmiersprachen)</a:t>
-            </a:r>
-            <a:endParaRPr lang="de-AT" sz="1600" dirty="0" smtClean="0"/>
+              <a:t> (objektorientierter Programmiersprachen)</a:t>
+            </a:r>
           </a:p>
           <a:p>
             <a:r>
               <a:rPr lang="de-AT" sz="1800" b="1" dirty="0" smtClean="0"/>
-              <a:t>Problemstellung</a:t>
-            </a:r>
-            <a:r>
-              <a:rPr lang="de-AT" sz="1800" b="1" dirty="0" smtClean="0"/>
-              <a:t>:</a:t>
+              <a:t>Problemstellung:</a:t>
             </a:r>
           </a:p>
           <a:p>
@@ -3780,11 +3767,7 @@
             <a:pPr lvl="1"/>
             <a:r>
               <a:rPr lang="de-AT" sz="1600" dirty="0" smtClean="0"/>
-              <a:t>Validierung / Abschätzung </a:t>
-            </a:r>
-            <a:r>
-              <a:rPr lang="de-AT" sz="1600" dirty="0" smtClean="0"/>
-              <a:t>von Software </a:t>
+              <a:t>Validierung / Abschätzung von Software </a:t>
             </a:r>
             <a:r>
               <a:rPr lang="de-AT" sz="1600" dirty="0" err="1" smtClean="0"/>
@@ -3792,22 +3775,13 @@
             </a:r>
             <a:r>
               <a:rPr lang="de-AT" sz="1600" dirty="0" smtClean="0"/>
-              <a:t> mit Code Change </a:t>
-            </a:r>
-            <a:r>
-              <a:rPr lang="de-AT" sz="1600" dirty="0" smtClean="0"/>
-              <a:t>Analysis</a:t>
-            </a:r>
-            <a:endParaRPr lang="de-AT" sz="1600" dirty="0" smtClean="0"/>
+              <a:t> mit Code Change Analysis</a:t>
+            </a:r>
           </a:p>
           <a:p>
             <a:r>
               <a:rPr lang="de-AT" sz="1800" b="1" dirty="0" smtClean="0"/>
-              <a:t>Verwendete </a:t>
-            </a:r>
-            <a:r>
-              <a:rPr lang="de-AT" sz="1800" b="1" dirty="0" smtClean="0"/>
-              <a:t>Methoden:</a:t>
+              <a:t>Verwendete Methoden:</a:t>
             </a:r>
           </a:p>
           <a:p>
@@ -3816,7 +3790,6 @@
               <a:rPr lang="de-AT" sz="1600" dirty="0" smtClean="0"/>
               <a:t>Literatur Recherche &amp; Zitieren</a:t>
             </a:r>
-            <a:endParaRPr lang="de-AT" sz="1600" dirty="0" smtClean="0"/>
           </a:p>
           <a:p>
             <a:pPr lvl="1"/>
@@ -3831,7 +3804,6 @@
               <a:rPr lang="de-AT" sz="1600" dirty="0" smtClean="0"/>
               <a:t>Studie</a:t>
             </a:r>
-            <a:endParaRPr lang="de-AT" sz="1600" dirty="0" smtClean="0"/>
           </a:p>
           <a:p>
             <a:r>
@@ -3851,11 +3823,7 @@
             </a:r>
             <a:r>
               <a:rPr lang="de-AT" sz="1600" dirty="0" smtClean="0"/>
-              <a:t> sind weniger aussagekräftig in Bezug auf </a:t>
-            </a:r>
-            <a:r>
-              <a:rPr lang="de-AT" sz="1600" dirty="0" smtClean="0"/>
-              <a:t>Code </a:t>
+              <a:t> sind weniger aussagekräftig in Bezug auf Code </a:t>
             </a:r>
             <a:r>
               <a:rPr lang="de-AT" sz="1600" dirty="0" err="1" smtClean="0"/>
@@ -3974,7 +3942,7 @@
         </p:nvGraphicFramePr>
         <p:xfrm>
           <a:off x="756270" y="1697125"/>
-          <a:ext cx="7954593" cy="2237232"/>
+          <a:ext cx="7954593" cy="3526536"/>
         </p:xfrm>
         <a:graphic>
           <a:graphicData uri="http://schemas.openxmlformats.org/drawingml/2006/table">
@@ -4010,14 +3978,6 @@
                         <a:rPr lang="de-AT" sz="1400" dirty="0" smtClean="0"/>
                         <a:t>Gesamtanzahl der Vorkommnisse </a:t>
                       </a:r>
-                      <a:r>
-                        <a:rPr lang="de-AT" sz="1400" dirty="0" smtClean="0">
-                          <a:solidFill>
-                            <a:srgbClr val="C00000"/>
-                          </a:solidFill>
-                        </a:rPr>
-                        <a:t>*)</a:t>
-                      </a:r>
                       <a:endParaRPr lang="de-AT" sz="1400" dirty="0">
                         <a:solidFill>
                           <a:srgbClr val="C00000"/>
@@ -4050,7 +4010,7 @@
                     <a:p>
                       <a:r>
                         <a:rPr lang="de-AT" sz="1600" dirty="0" smtClean="0"/>
-                        <a:t>hoffentlich 12 ;)</a:t>
+                        <a:t>12</a:t>
                       </a:r>
                       <a:endParaRPr lang="de-AT" sz="1600" dirty="0"/>
                     </a:p>
@@ -4080,7 +4040,97 @@
                     <a:p>
                       <a:r>
                         <a:rPr lang="de-AT" sz="1600" dirty="0" smtClean="0"/>
-                        <a:t>1</a:t>
+                        <a:t>7</a:t>
+                      </a:r>
+                      <a:endParaRPr lang="de-AT" sz="1600" dirty="0"/>
+                    </a:p>
+                  </a:txBody>
+                  <a:tcPr/>
+                </a:tc>
+              </a:tr>
+              <a:tr h="429768">
+                <a:tc>
+                  <a:txBody>
+                    <a:bodyPr/>
+                    <a:lstStyle/>
+                    <a:p>
+                      <a:r>
+                        <a:rPr lang="de-AT" sz="1600" dirty="0" smtClean="0"/>
+                        <a:t>Modellierung</a:t>
+                      </a:r>
+                      <a:endParaRPr lang="de-AT" sz="1600" dirty="0"/>
+                    </a:p>
+                  </a:txBody>
+                  <a:tcPr/>
+                </a:tc>
+                <a:tc>
+                  <a:txBody>
+                    <a:bodyPr/>
+                    <a:lstStyle/>
+                    <a:p>
+                      <a:r>
+                        <a:rPr lang="de-AT" sz="1600" dirty="0" smtClean="0"/>
+                        <a:t>5</a:t>
+                      </a:r>
+                      <a:endParaRPr lang="de-AT" sz="1600" dirty="0"/>
+                    </a:p>
+                  </a:txBody>
+                  <a:tcPr/>
+                </a:tc>
+              </a:tr>
+              <a:tr h="429768">
+                <a:tc>
+                  <a:txBody>
+                    <a:bodyPr/>
+                    <a:lstStyle/>
+                    <a:p>
+                      <a:r>
+                        <a:rPr lang="de-AT" sz="1600" dirty="0" smtClean="0"/>
+                        <a:t>Studie / Umfrage</a:t>
+                      </a:r>
+                      <a:endParaRPr lang="de-AT" sz="1600" dirty="0"/>
+                    </a:p>
+                  </a:txBody>
+                  <a:tcPr/>
+                </a:tc>
+                <a:tc>
+                  <a:txBody>
+                    <a:bodyPr/>
+                    <a:lstStyle/>
+                    <a:p>
+                      <a:r>
+                        <a:rPr lang="de-AT" sz="1600" dirty="0" smtClean="0"/>
+                        <a:t>4</a:t>
+                      </a:r>
+                      <a:endParaRPr lang="de-AT" sz="1600" dirty="0"/>
+                    </a:p>
+                  </a:txBody>
+                  <a:tcPr/>
+                </a:tc>
+              </a:tr>
+              <a:tr h="429768">
+                <a:tc>
+                  <a:txBody>
+                    <a:bodyPr/>
+                    <a:lstStyle/>
+                    <a:p>
+                      <a:r>
+                        <a:rPr lang="de-AT" sz="1600" dirty="0" smtClean="0"/>
+                        <a:t>kontrolliertes Experiment &amp; Messen</a:t>
+                      </a:r>
+                      <a:endParaRPr lang="de-AT" sz="1600" dirty="0"/>
+                    </a:p>
+                  </a:txBody>
+                  <a:tcPr/>
+                </a:tc>
+                <a:tc>
+                  <a:txBody>
+                    <a:bodyPr/>
+                    <a:lstStyle/>
+                    <a:p>
+                      <a:r>
+                        <a:rPr lang="de-AT" sz="1600" dirty="0" smtClean="0"/>
+                        <a:t>4</a:t>
                       </a:r>
                       <a:endParaRPr lang="de-AT" sz="1600" dirty="0"/>
                     </a:p>
@@ -4112,8 +4162,8 @@
                         <a:defRPr/>
                       </a:pPr>
                       <a:r>
-                        <a:rPr lang="de-AT" sz="1600" baseline="0" dirty="0" smtClean="0"/>
-                        <a:t>Experiment</a:t>
+                        <a:rPr lang="de-AT" sz="1600" baseline="0" dirty="0" err="1" smtClean="0"/>
+                        <a:t>Benchmarking</a:t>
                       </a:r>
                       <a:endParaRPr lang="de-AT" sz="1600" dirty="0" smtClean="0"/>
                     </a:p>
@@ -4127,7 +4177,7 @@
                     <a:p>
                       <a:r>
                         <a:rPr lang="de-AT" sz="1600" dirty="0" smtClean="0"/>
-                        <a:t>1</a:t>
+                        <a:t>4</a:t>
                       </a:r>
                       <a:endParaRPr lang="de-AT" sz="1600" dirty="0"/>
                     </a:p>
@@ -4143,8 +4193,9 @@
                     <a:p>
                       <a:r>
                         <a:rPr lang="de-AT" sz="1600" dirty="0" smtClean="0"/>
-                        <a:t>Studie</a:t>
+                        <a:t>Formale Beweise</a:t>
                       </a:r>
+                      <a:endParaRPr lang="de-AT" sz="1600" dirty="0" smtClean="0"/>
                     </a:p>
                   </a:txBody>
                   <a:tcPr/>
@@ -4168,89 +4219,6 @@
           </a:graphicData>
         </a:graphic>
       </p:graphicFrame>
-      <p:sp>
-        <p:nvSpPr>
-          <p:cNvPr id="7" name="Textfeld 6"/>
-          <p:cNvSpPr txBox="1"/>
-          <p:nvPr/>
-        </p:nvSpPr>
-        <p:spPr>
-          <a:xfrm>
-            <a:off x="790646" y="5617029"/>
-            <a:ext cx="7982094" cy="338554"/>
-          </a:xfrm>
-          <a:prstGeom prst="rect">
-            <a:avLst/>
-          </a:prstGeom>
-          <a:noFill/>
-        </p:spPr>
-        <p:txBody>
-          <a:bodyPr wrap="square" rtlCol="0">
-            <a:spAutoFit/>
-          </a:bodyPr>
-          <a:lstStyle/>
-          <a:p>
-            <a:r>
-              <a:rPr lang="de-AT" sz="1600" dirty="0" smtClean="0">
-                <a:solidFill>
-                  <a:srgbClr val="C00000"/>
-                </a:solidFill>
-              </a:rPr>
-              <a:t>*) Tabelle nach der am häufigsten verwendeten Methode sortieren!</a:t>
-            </a:r>
-            <a:endParaRPr lang="de-AT" sz="1600" dirty="0">
-              <a:solidFill>
-                <a:srgbClr val="C00000"/>
-              </a:solidFill>
-            </a:endParaRPr>
-          </a:p>
-        </p:txBody>
-      </p:sp>
-      <p:sp>
-        <p:nvSpPr>
-          <p:cNvPr id="8" name="Rechteck 7"/>
-          <p:cNvSpPr/>
-          <p:nvPr/>
-        </p:nvSpPr>
-        <p:spPr>
-          <a:xfrm>
-            <a:off x="754836" y="4249281"/>
-            <a:ext cx="5190267" cy="369332"/>
-          </a:xfrm>
-          <a:prstGeom prst="rect">
-            <a:avLst/>
-          </a:prstGeom>
-        </p:spPr>
-        <p:txBody>
-          <a:bodyPr wrap="none">
-            <a:spAutoFit/>
-          </a:bodyPr>
-          <a:lstStyle/>
-          <a:p>
-            <a:r>
-              <a:rPr lang="en-US" sz="1800" i="1" dirty="0" smtClean="0"/>
-              <a:t>&lt; </a:t>
-            </a:r>
-            <a:r>
-              <a:rPr lang="en-US" sz="1800" i="1" dirty="0" err="1" smtClean="0"/>
-              <a:t>Sonstige</a:t>
-            </a:r>
-            <a:r>
-              <a:rPr lang="en-US" sz="1800" i="1" dirty="0" smtClean="0"/>
-              <a:t> </a:t>
-            </a:r>
-            <a:r>
-              <a:rPr lang="en-US" sz="1800" i="1" dirty="0" err="1" smtClean="0"/>
-              <a:t>Anmerkungen</a:t>
-            </a:r>
-            <a:r>
-              <a:rPr lang="en-US" sz="1800" i="1" dirty="0" smtClean="0"/>
-              <a:t> / Lessons Learned ... &gt;</a:t>
-            </a:r>
-            <a:endParaRPr lang="en-US" sz="1800" i="1" dirty="0"/>
-          </a:p>
-        </p:txBody>
-      </p:sp>
     </p:spTree>
   </p:cSld>
   <p:clrMapOvr>

</xml_diff>